<commit_message>
behavior and remaining latency differences
</commit_message>
<xml_diff>
--- a/Casual Figures/fNIRSandGerbils Update 1-29.pptx
+++ b/Casual Figures/fNIRSandGerbils Update 1-29.pptx
@@ -7,9 +7,11 @@
   <p:sldIdLst>
     <p:sldId id="256" r:id="rId2"/>
     <p:sldId id="257" r:id="rId3"/>
-    <p:sldId id="258" r:id="rId4"/>
-    <p:sldId id="259" r:id="rId5"/>
-    <p:sldId id="260" r:id="rId6"/>
+    <p:sldId id="261" r:id="rId4"/>
+    <p:sldId id="262" r:id="rId5"/>
+    <p:sldId id="258" r:id="rId6"/>
+    <p:sldId id="259" r:id="rId7"/>
+    <p:sldId id="260" r:id="rId8"/>
   </p:sldIdLst>
   <p:sldSz cx="12192000" cy="6858000"/>
   <p:notesSz cx="6858000" cy="9144000"/>
@@ -3578,6 +3580,378 @@
 <file path=ppt/slides/slide3.xml><?xml version="1.0" encoding="utf-8"?>
 <p:sld xmlns:a="http://schemas.openxmlformats.org/drawingml/2006/main" xmlns:r="http://schemas.openxmlformats.org/officeDocument/2006/relationships" xmlns:p="http://schemas.openxmlformats.org/presentationml/2006/main">
   <p:cSld>
+    <p:bg>
+      <p:bgPr>
+        <a:solidFill>
+          <a:schemeClr val="bg1"/>
+        </a:solidFill>
+        <a:effectLst/>
+      </p:bgPr>
+    </p:bg>
+    <p:spTree>
+      <p:nvGrpSpPr>
+        <p:cNvPr id="1" name=""/>
+        <p:cNvGrpSpPr/>
+        <p:nvPr/>
+      </p:nvGrpSpPr>
+      <p:grpSpPr>
+        <a:xfrm>
+          <a:off x="0" y="0"/>
+          <a:ext cx="0" cy="0"/>
+          <a:chOff x="0" y="0"/>
+          <a:chExt cx="0" cy="0"/>
+        </a:xfrm>
+      </p:grpSpPr>
+      <p:sp useBgFill="1">
+        <p:nvSpPr>
+          <p:cNvPr id="48" name="Rectangle 47">
+            <a:extLst>
+              <a:ext uri="{FF2B5EF4-FFF2-40B4-BE49-F238E27FC236}">
+                <a16:creationId xmlns:a16="http://schemas.microsoft.com/office/drawing/2014/main" id="{3B47FC9C-2ED3-4100-A4EF-E8CDFEE106C9}"/>
+              </a:ext>
+              <a:ext uri="{C183D7F6-B498-43B3-948B-1728B52AA6E4}">
+                <adec:decorative xmlns:adec="http://schemas.microsoft.com/office/drawing/2017/decorative" val="1"/>
+              </a:ext>
+            </a:extLst>
+          </p:cNvPr>
+          <p:cNvSpPr>
+            <a:spLocks noGrp="1" noRot="1" noChangeAspect="1" noMove="1" noResize="1" noEditPoints="1" noAdjustHandles="1" noChangeArrowheads="1" noChangeShapeType="1" noTextEdit="1"/>
+          </p:cNvSpPr>
+          <p:nvPr>
+            <p:extLst>
+              <p:ext uri="{386F3935-93C4-4BCD-93E2-E3B085C9AB24}">
+                <p16:designElem xmlns:p16="http://schemas.microsoft.com/office/powerpoint/2015/main" val="1"/>
+              </p:ext>
+            </p:extLst>
+          </p:nvPr>
+        </p:nvSpPr>
+        <p:spPr>
+          <a:xfrm>
+            <a:off x="-1" y="0"/>
+            <a:ext cx="12188952" cy="6858000"/>
+          </a:xfrm>
+          <a:prstGeom prst="rect">
+            <a:avLst/>
+          </a:prstGeom>
+          <a:ln>
+            <a:noFill/>
+          </a:ln>
+        </p:spPr>
+        <p:style>
+          <a:lnRef idx="2">
+            <a:schemeClr val="accent1">
+              <a:shade val="50000"/>
+            </a:schemeClr>
+          </a:lnRef>
+          <a:fillRef idx="1">
+            <a:schemeClr val="accent1"/>
+          </a:fillRef>
+          <a:effectRef idx="0">
+            <a:schemeClr val="accent1"/>
+          </a:effectRef>
+          <a:fontRef idx="minor">
+            <a:schemeClr val="lt1"/>
+          </a:fontRef>
+        </p:style>
+        <p:txBody>
+          <a:bodyPr rtlCol="0" anchor="ctr"/>
+          <a:lstStyle/>
+          <a:p>
+            <a:pPr algn="ctr"/>
+            <a:endParaRPr lang="en-US" dirty="0"/>
+          </a:p>
+        </p:txBody>
+      </p:sp>
+      <p:pic>
+        <p:nvPicPr>
+          <p:cNvPr id="10" name="Picture 9">
+            <a:extLst>
+              <a:ext uri="{FF2B5EF4-FFF2-40B4-BE49-F238E27FC236}">
+                <a16:creationId xmlns:a16="http://schemas.microsoft.com/office/drawing/2014/main" id="{85D634E9-2E8F-2D0F-80F8-B8753684EE26}"/>
+              </a:ext>
+            </a:extLst>
+          </p:cNvPr>
+          <p:cNvPicPr>
+            <a:picLocks noChangeAspect="1"/>
+          </p:cNvPicPr>
+          <p:nvPr/>
+        </p:nvPicPr>
+        <p:blipFill>
+          <a:blip r:embed="rId2"/>
+          <a:stretch>
+            <a:fillRect/>
+          </a:stretch>
+        </p:blipFill>
+        <p:spPr>
+          <a:xfrm>
+            <a:off x="642938" y="725488"/>
+            <a:ext cx="5418138" cy="4287838"/>
+          </a:xfrm>
+          <a:prstGeom prst="rect">
+            <a:avLst/>
+          </a:prstGeom>
+        </p:spPr>
+      </p:pic>
+      <p:pic>
+        <p:nvPicPr>
+          <p:cNvPr id="11" name="Picture 10">
+            <a:extLst>
+              <a:ext uri="{FF2B5EF4-FFF2-40B4-BE49-F238E27FC236}">
+                <a16:creationId xmlns:a16="http://schemas.microsoft.com/office/drawing/2014/main" id="{94BC9046-E518-A407-AE59-AF5D8316B404}"/>
+              </a:ext>
+            </a:extLst>
+          </p:cNvPr>
+          <p:cNvPicPr>
+            <a:picLocks noChangeAspect="1"/>
+          </p:cNvPicPr>
+          <p:nvPr/>
+        </p:nvPicPr>
+        <p:blipFill>
+          <a:blip r:embed="rId3"/>
+          <a:stretch>
+            <a:fillRect/>
+          </a:stretch>
+        </p:blipFill>
+        <p:spPr>
+          <a:xfrm>
+            <a:off x="6135688" y="725488"/>
+            <a:ext cx="5411788" cy="4287838"/>
+          </a:xfrm>
+          <a:prstGeom prst="rect">
+            <a:avLst/>
+          </a:prstGeom>
+        </p:spPr>
+      </p:pic>
+      <p:sp>
+        <p:nvSpPr>
+          <p:cNvPr id="2" name="Title 1">
+            <a:extLst>
+              <a:ext uri="{FF2B5EF4-FFF2-40B4-BE49-F238E27FC236}">
+                <a16:creationId xmlns:a16="http://schemas.microsoft.com/office/drawing/2014/main" id="{E54AAD13-5752-9DD5-A973-7582F600C076}"/>
+              </a:ext>
+            </a:extLst>
+          </p:cNvPr>
+          <p:cNvSpPr>
+            <a:spLocks noGrp="1"/>
+          </p:cNvSpPr>
+          <p:nvPr>
+            <p:ph type="title"/>
+          </p:nvPr>
+        </p:nvSpPr>
+        <p:spPr>
+          <a:xfrm>
+            <a:off x="838200" y="5358141"/>
+            <a:ext cx="10515600" cy="942664"/>
+          </a:xfrm>
+        </p:spPr>
+        <p:txBody>
+          <a:bodyPr vert="horz" lIns="91440" tIns="45720" rIns="91440" bIns="45720" rtlCol="0" anchor="ctr">
+            <a:normAutofit/>
+          </a:bodyPr>
+          <a:lstStyle/>
+          <a:p>
+            <a:pPr algn="ctr"/>
+            <a:r>
+              <a:rPr lang="en-US" sz="3300" kern="1200">
+                <a:solidFill>
+                  <a:schemeClr val="tx1"/>
+                </a:solidFill>
+                <a:latin typeface="+mj-lt"/>
+                <a:ea typeface="+mj-ea"/>
+                <a:cs typeface="+mj-cs"/>
+              </a:rPr>
+              <a:t>Behavior Data of Five Subjects	- Hit and False Alarm Rates</a:t>
+            </a:r>
+          </a:p>
+        </p:txBody>
+      </p:sp>
+    </p:spTree>
+    <p:extLst>
+      <p:ext uri="{BB962C8B-B14F-4D97-AF65-F5344CB8AC3E}">
+        <p14:creationId xmlns:p14="http://schemas.microsoft.com/office/powerpoint/2010/main" val="1481951819"/>
+      </p:ext>
+    </p:extLst>
+  </p:cSld>
+  <p:clrMapOvr>
+    <a:masterClrMapping/>
+  </p:clrMapOvr>
+</p:sld>
+</file>
+
+<file path=ppt/slides/slide4.xml><?xml version="1.0" encoding="utf-8"?>
+<p:sld xmlns:a="http://schemas.openxmlformats.org/drawingml/2006/main" xmlns:r="http://schemas.openxmlformats.org/officeDocument/2006/relationships" xmlns:p="http://schemas.openxmlformats.org/presentationml/2006/main">
+  <p:cSld>
+    <p:bg>
+      <p:bgPr>
+        <a:solidFill>
+          <a:schemeClr val="bg1"/>
+        </a:solidFill>
+        <a:effectLst/>
+      </p:bgPr>
+    </p:bg>
+    <p:spTree>
+      <p:nvGrpSpPr>
+        <p:cNvPr id="1" name=""/>
+        <p:cNvGrpSpPr/>
+        <p:nvPr/>
+      </p:nvGrpSpPr>
+      <p:grpSpPr>
+        <a:xfrm>
+          <a:off x="0" y="0"/>
+          <a:ext cx="0" cy="0"/>
+          <a:chOff x="0" y="0"/>
+          <a:chExt cx="0" cy="0"/>
+        </a:xfrm>
+      </p:grpSpPr>
+      <p:sp useBgFill="1">
+        <p:nvSpPr>
+          <p:cNvPr id="32" name="Rectangle 31">
+            <a:extLst>
+              <a:ext uri="{FF2B5EF4-FFF2-40B4-BE49-F238E27FC236}">
+                <a16:creationId xmlns:a16="http://schemas.microsoft.com/office/drawing/2014/main" id="{3B47FC9C-2ED3-4100-A4EF-E8CDFEE106C9}"/>
+              </a:ext>
+              <a:ext uri="{C183D7F6-B498-43B3-948B-1728B52AA6E4}">
+                <adec:decorative xmlns:adec="http://schemas.microsoft.com/office/drawing/2017/decorative" val="1"/>
+              </a:ext>
+            </a:extLst>
+          </p:cNvPr>
+          <p:cNvSpPr>
+            <a:spLocks noGrp="1" noRot="1" noChangeAspect="1" noMove="1" noResize="1" noEditPoints="1" noAdjustHandles="1" noChangeArrowheads="1" noChangeShapeType="1" noTextEdit="1"/>
+          </p:cNvSpPr>
+          <p:nvPr>
+            <p:extLst>
+              <p:ext uri="{386F3935-93C4-4BCD-93E2-E3B085C9AB24}">
+                <p16:designElem xmlns:p16="http://schemas.microsoft.com/office/powerpoint/2015/main" val="1"/>
+              </p:ext>
+            </p:extLst>
+          </p:nvPr>
+        </p:nvSpPr>
+        <p:spPr>
+          <a:xfrm>
+            <a:off x="-1" y="0"/>
+            <a:ext cx="12188952" cy="6858000"/>
+          </a:xfrm>
+          <a:prstGeom prst="rect">
+            <a:avLst/>
+          </a:prstGeom>
+          <a:ln>
+            <a:noFill/>
+          </a:ln>
+        </p:spPr>
+        <p:style>
+          <a:lnRef idx="2">
+            <a:schemeClr val="accent1">
+              <a:shade val="50000"/>
+            </a:schemeClr>
+          </a:lnRef>
+          <a:fillRef idx="1">
+            <a:schemeClr val="accent1"/>
+          </a:fillRef>
+          <a:effectRef idx="0">
+            <a:schemeClr val="accent1"/>
+          </a:effectRef>
+          <a:fontRef idx="minor">
+            <a:schemeClr val="lt1"/>
+          </a:fontRef>
+        </p:style>
+        <p:txBody>
+          <a:bodyPr rtlCol="0" anchor="ctr"/>
+          <a:lstStyle/>
+          <a:p>
+            <a:pPr algn="ctr"/>
+            <a:endParaRPr lang="en-US" dirty="0"/>
+          </a:p>
+        </p:txBody>
+      </p:sp>
+      <p:sp>
+        <p:nvSpPr>
+          <p:cNvPr id="2" name="Title 1">
+            <a:extLst>
+              <a:ext uri="{FF2B5EF4-FFF2-40B4-BE49-F238E27FC236}">
+                <a16:creationId xmlns:a16="http://schemas.microsoft.com/office/drawing/2014/main" id="{E54AAD13-5752-9DD5-A973-7582F600C076}"/>
+              </a:ext>
+            </a:extLst>
+          </p:cNvPr>
+          <p:cNvSpPr>
+            <a:spLocks noGrp="1"/>
+          </p:cNvSpPr>
+          <p:nvPr>
+            <p:ph type="title"/>
+          </p:nvPr>
+        </p:nvSpPr>
+        <p:spPr>
+          <a:xfrm>
+            <a:off x="838200" y="5358141"/>
+            <a:ext cx="10515600" cy="942664"/>
+          </a:xfrm>
+        </p:spPr>
+        <p:txBody>
+          <a:bodyPr vert="horz" lIns="91440" tIns="45720" rIns="91440" bIns="45720" rtlCol="0" anchor="ctr">
+            <a:normAutofit/>
+          </a:bodyPr>
+          <a:lstStyle/>
+          <a:p>
+            <a:pPr algn="ctr"/>
+            <a:r>
+              <a:rPr lang="en-US" kern="1200">
+                <a:solidFill>
+                  <a:schemeClr val="tx1"/>
+                </a:solidFill>
+                <a:latin typeface="+mj-lt"/>
+                <a:ea typeface="+mj-ea"/>
+                <a:cs typeface="+mj-cs"/>
+              </a:rPr>
+              <a:t>Behavior Data of Five Subjects – D primes	</a:t>
+            </a:r>
+          </a:p>
+        </p:txBody>
+      </p:sp>
+      <p:pic>
+        <p:nvPicPr>
+          <p:cNvPr id="5" name="Content Placeholder 4">
+            <a:extLst>
+              <a:ext uri="{FF2B5EF4-FFF2-40B4-BE49-F238E27FC236}">
+                <a16:creationId xmlns:a16="http://schemas.microsoft.com/office/drawing/2014/main" id="{FB988800-80FC-04CA-7BCC-0AF42FABAC76}"/>
+              </a:ext>
+            </a:extLst>
+          </p:cNvPr>
+          <p:cNvPicPr>
+            <a:picLocks noChangeAspect="1"/>
+          </p:cNvPicPr>
+          <p:nvPr/>
+        </p:nvPicPr>
+        <p:blipFill>
+          <a:blip r:embed="rId2"/>
+          <a:stretch>
+            <a:fillRect/>
+          </a:stretch>
+        </p:blipFill>
+        <p:spPr>
+          <a:xfrm>
+            <a:off x="2465226" y="557189"/>
+            <a:ext cx="7261548" cy="4629236"/>
+          </a:xfrm>
+          <a:prstGeom prst="rect">
+            <a:avLst/>
+          </a:prstGeom>
+        </p:spPr>
+      </p:pic>
+    </p:spTree>
+    <p:extLst>
+      <p:ext uri="{BB962C8B-B14F-4D97-AF65-F5344CB8AC3E}">
+        <p14:creationId xmlns:p14="http://schemas.microsoft.com/office/powerpoint/2010/main" val="388329395"/>
+      </p:ext>
+    </p:extLst>
+  </p:cSld>
+  <p:clrMapOvr>
+    <a:masterClrMapping/>
+  </p:clrMapOvr>
+</p:sld>
+</file>
+
+<file path=ppt/slides/slide5.xml><?xml version="1.0" encoding="utf-8"?>
+<p:sld xmlns:a="http://schemas.openxmlformats.org/drawingml/2006/main" xmlns:r="http://schemas.openxmlformats.org/officeDocument/2006/relationships" xmlns:p="http://schemas.openxmlformats.org/presentationml/2006/main">
+  <p:cSld>
     <p:spTree>
       <p:nvGrpSpPr>
         <p:cNvPr id="1" name=""/>
@@ -3668,7 +4042,7 @@
 </p:sld>
 </file>
 
-<file path=ppt/slides/slide4.xml><?xml version="1.0" encoding="utf-8"?>
+<file path=ppt/slides/slide6.xml><?xml version="1.0" encoding="utf-8"?>
 <p:sld xmlns:a="http://schemas.openxmlformats.org/drawingml/2006/main" xmlns:r="http://schemas.openxmlformats.org/officeDocument/2006/relationships" xmlns:p="http://schemas.openxmlformats.org/presentationml/2006/main">
   <p:cSld>
     <p:spTree>
@@ -3761,7 +4135,7 @@
 </p:sld>
 </file>
 
-<file path=ppt/slides/slide5.xml><?xml version="1.0" encoding="utf-8"?>
+<file path=ppt/slides/slide7.xml><?xml version="1.0" encoding="utf-8"?>
 <p:sld xmlns:a="http://schemas.openxmlformats.org/drawingml/2006/main" xmlns:r="http://schemas.openxmlformats.org/officeDocument/2006/relationships" xmlns:p="http://schemas.openxmlformats.org/presentationml/2006/main">
   <p:cSld>
     <p:spTree>

</xml_diff>